<commit_message>
Updated notes on cross-validation
Updated notes on cross-validation in RSA Regression to explain how I introduce variance in the outcomes when dealing with group-level data.
</commit_message>
<xml_diff>
--- a/Explainers/RSA-Regression.pptx
+++ b/Explainers/RSA-Regression.pptx
@@ -7,6 +7,9 @@
   <p:sldIdLst>
     <p:sldId id="256" r:id="rId2"/>
     <p:sldId id="257" r:id="rId3"/>
+    <p:sldId id="258" r:id="rId4"/>
+    <p:sldId id="259" r:id="rId5"/>
+    <p:sldId id="260" r:id="rId6"/>
   </p:sldIdLst>
   <p:sldSz cx="12192000" cy="6858000"/>
   <p:notesSz cx="6858000" cy="9144000"/>
@@ -116,6 +119,9 @@
         <p14:section name="Cross-validation" id="{5595D22C-452D-4D77-9515-2E661056519C}">
           <p14:sldIdLst>
             <p14:sldId id="257"/>
+            <p14:sldId id="258"/>
+            <p14:sldId id="259"/>
+            <p14:sldId id="260"/>
           </p14:sldIdLst>
         </p14:section>
       </p14:sectionLst>
@@ -274,7 +280,7 @@
           <a:p>
             <a:fld id="{90058CA9-002D-4B63-A047-5B0DDF22146E}" type="datetimeFigureOut">
               <a:rPr lang="en-US" smtClean="0"/>
-              <a:t>8/10/2020</a:t>
+              <a:t>8/18/2020</a:t>
             </a:fld>
             <a:endParaRPr lang="en-US"/>
           </a:p>
@@ -472,7 +478,7 @@
           <a:p>
             <a:fld id="{90058CA9-002D-4B63-A047-5B0DDF22146E}" type="datetimeFigureOut">
               <a:rPr lang="en-US" smtClean="0"/>
-              <a:t>8/10/2020</a:t>
+              <a:t>8/18/2020</a:t>
             </a:fld>
             <a:endParaRPr lang="en-US"/>
           </a:p>
@@ -680,7 +686,7 @@
           <a:p>
             <a:fld id="{90058CA9-002D-4B63-A047-5B0DDF22146E}" type="datetimeFigureOut">
               <a:rPr lang="en-US" smtClean="0"/>
-              <a:t>8/10/2020</a:t>
+              <a:t>8/18/2020</a:t>
             </a:fld>
             <a:endParaRPr lang="en-US"/>
           </a:p>
@@ -878,7 +884,7 @@
           <a:p>
             <a:fld id="{90058CA9-002D-4B63-A047-5B0DDF22146E}" type="datetimeFigureOut">
               <a:rPr lang="en-US" smtClean="0"/>
-              <a:t>8/10/2020</a:t>
+              <a:t>8/18/2020</a:t>
             </a:fld>
             <a:endParaRPr lang="en-US"/>
           </a:p>
@@ -1153,7 +1159,7 @@
           <a:p>
             <a:fld id="{90058CA9-002D-4B63-A047-5B0DDF22146E}" type="datetimeFigureOut">
               <a:rPr lang="en-US" smtClean="0"/>
-              <a:t>8/10/2020</a:t>
+              <a:t>8/18/2020</a:t>
             </a:fld>
             <a:endParaRPr lang="en-US"/>
           </a:p>
@@ -1418,7 +1424,7 @@
           <a:p>
             <a:fld id="{90058CA9-002D-4B63-A047-5B0DDF22146E}" type="datetimeFigureOut">
               <a:rPr lang="en-US" smtClean="0"/>
-              <a:t>8/10/2020</a:t>
+              <a:t>8/18/2020</a:t>
             </a:fld>
             <a:endParaRPr lang="en-US"/>
           </a:p>
@@ -1830,7 +1836,7 @@
           <a:p>
             <a:fld id="{90058CA9-002D-4B63-A047-5B0DDF22146E}" type="datetimeFigureOut">
               <a:rPr lang="en-US" smtClean="0"/>
-              <a:t>8/10/2020</a:t>
+              <a:t>8/18/2020</a:t>
             </a:fld>
             <a:endParaRPr lang="en-US"/>
           </a:p>
@@ -1971,7 +1977,7 @@
           <a:p>
             <a:fld id="{90058CA9-002D-4B63-A047-5B0DDF22146E}" type="datetimeFigureOut">
               <a:rPr lang="en-US" smtClean="0"/>
-              <a:t>8/10/2020</a:t>
+              <a:t>8/18/2020</a:t>
             </a:fld>
             <a:endParaRPr lang="en-US"/>
           </a:p>
@@ -2084,7 +2090,7 @@
           <a:p>
             <a:fld id="{90058CA9-002D-4B63-A047-5B0DDF22146E}" type="datetimeFigureOut">
               <a:rPr lang="en-US" smtClean="0"/>
-              <a:t>8/10/2020</a:t>
+              <a:t>8/18/2020</a:t>
             </a:fld>
             <a:endParaRPr lang="en-US"/>
           </a:p>
@@ -2395,7 +2401,7 @@
           <a:p>
             <a:fld id="{90058CA9-002D-4B63-A047-5B0DDF22146E}" type="datetimeFigureOut">
               <a:rPr lang="en-US" smtClean="0"/>
-              <a:t>8/10/2020</a:t>
+              <a:t>8/18/2020</a:t>
             </a:fld>
             <a:endParaRPr lang="en-US"/>
           </a:p>
@@ -2683,7 +2689,7 @@
           <a:p>
             <a:fld id="{90058CA9-002D-4B63-A047-5B0DDF22146E}" type="datetimeFigureOut">
               <a:rPr lang="en-US" smtClean="0"/>
-              <a:t>8/10/2020</a:t>
+              <a:t>8/18/2020</a:t>
             </a:fld>
             <a:endParaRPr lang="en-US"/>
           </a:p>
@@ -2924,7 +2930,7 @@
           <a:p>
             <a:fld id="{90058CA9-002D-4B63-A047-5B0DDF22146E}" type="datetimeFigureOut">
               <a:rPr lang="en-US" smtClean="0"/>
-              <a:t>8/10/2020</a:t>
+              <a:t>8/18/2020</a:t>
             </a:fld>
             <a:endParaRPr lang="en-US"/>
           </a:p>
@@ -6413,7 +6419,7 @@
         <p:spPr>
           <a:xfrm>
             <a:off x="3005955" y="34808"/>
-            <a:ext cx="6180090" cy="400110"/>
+            <a:ext cx="6217728" cy="707886"/>
           </a:xfrm>
           <a:prstGeom prst="rect">
             <a:avLst/>
@@ -6426,9 +6432,17 @@
           </a:bodyPr>
           <a:lstStyle/>
           <a:p>
+            <a:pPr algn="ctr"/>
             <a:r>
               <a:rPr lang="en-US" sz="2000" b="1" dirty="0"/>
               <a:t>Cross-validation to get a model’s prediction performance</a:t>
+            </a:r>
+          </a:p>
+          <a:p>
+            <a:pPr algn="ctr"/>
+            <a:r>
+              <a:rPr lang="en-US" sz="2000" b="1" dirty="0"/>
+              <a:t>Method 1: Standard Method</a:t>
             </a:r>
           </a:p>
         </p:txBody>
@@ -6437,6 +6451,2088 @@
     <p:extLst>
       <p:ext uri="{BB962C8B-B14F-4D97-AF65-F5344CB8AC3E}">
         <p14:creationId xmlns:p14="http://schemas.microsoft.com/office/powerpoint/2010/main" val="1131170218"/>
+      </p:ext>
+    </p:extLst>
+  </p:cSld>
+  <p:clrMapOvr>
+    <a:masterClrMapping/>
+  </p:clrMapOvr>
+</p:sld>
+</file>
+
+<file path=ppt/slides/slide3.xml><?xml version="1.0" encoding="utf-8"?>
+<p:sld xmlns:a="http://schemas.openxmlformats.org/drawingml/2006/main" xmlns:r="http://schemas.openxmlformats.org/officeDocument/2006/relationships" xmlns:p="http://schemas.openxmlformats.org/presentationml/2006/main">
+  <p:cSld>
+    <p:spTree>
+      <p:nvGrpSpPr>
+        <p:cNvPr id="1" name=""/>
+        <p:cNvGrpSpPr/>
+        <p:nvPr/>
+      </p:nvGrpSpPr>
+      <p:grpSpPr>
+        <a:xfrm>
+          <a:off x="0" y="0"/>
+          <a:ext cx="0" cy="0"/>
+          <a:chOff x="0" y="0"/>
+          <a:chExt cx="0" cy="0"/>
+        </a:xfrm>
+      </p:grpSpPr>
+      <p:sp>
+        <p:nvSpPr>
+          <p:cNvPr id="5" name="TextBox 4">
+            <a:extLst>
+              <a:ext uri="{FF2B5EF4-FFF2-40B4-BE49-F238E27FC236}">
+                <a16:creationId xmlns:a16="http://schemas.microsoft.com/office/drawing/2014/main" id="{DA18BA5B-B14F-40BA-8CB2-2354C3FD70D1}"/>
+              </a:ext>
+            </a:extLst>
+          </p:cNvPr>
+          <p:cNvSpPr txBox="1"/>
+          <p:nvPr/>
+        </p:nvSpPr>
+        <p:spPr>
+          <a:xfrm>
+            <a:off x="3005955" y="34808"/>
+            <a:ext cx="6217728" cy="707886"/>
+          </a:xfrm>
+          <a:prstGeom prst="rect">
+            <a:avLst/>
+          </a:prstGeom>
+          <a:noFill/>
+        </p:spPr>
+        <p:txBody>
+          <a:bodyPr wrap="none" rtlCol="0">
+            <a:spAutoFit/>
+          </a:bodyPr>
+          <a:lstStyle/>
+          <a:p>
+            <a:pPr algn="ctr"/>
+            <a:r>
+              <a:rPr lang="en-US" sz="2000" b="1" dirty="0"/>
+              <a:t>Cross-validation to get a model’s prediction performance</a:t>
+            </a:r>
+          </a:p>
+          <a:p>
+            <a:pPr algn="ctr"/>
+            <a:r>
+              <a:rPr lang="en-US" sz="2000" b="1" dirty="0"/>
+              <a:t>Method 1: Standard Method, continued</a:t>
+            </a:r>
+          </a:p>
+        </p:txBody>
+      </p:sp>
+      <p:sp>
+        <p:nvSpPr>
+          <p:cNvPr id="6" name="TextBox 5">
+            <a:extLst>
+              <a:ext uri="{FF2B5EF4-FFF2-40B4-BE49-F238E27FC236}">
+                <a16:creationId xmlns:a16="http://schemas.microsoft.com/office/drawing/2014/main" id="{74C320DA-9805-4D86-B59B-46B04CF3E18D}"/>
+              </a:ext>
+            </a:extLst>
+          </p:cNvPr>
+          <p:cNvSpPr txBox="1"/>
+          <p:nvPr/>
+        </p:nvSpPr>
+        <p:spPr>
+          <a:xfrm>
+            <a:off x="607340" y="1342238"/>
+            <a:ext cx="11162414" cy="3139321"/>
+          </a:xfrm>
+          <a:prstGeom prst="rect">
+            <a:avLst/>
+          </a:prstGeom>
+          <a:noFill/>
+        </p:spPr>
+        <p:txBody>
+          <a:bodyPr wrap="square" rtlCol="0">
+            <a:spAutoFit/>
+          </a:bodyPr>
+          <a:lstStyle/>
+          <a:p>
+            <a:r>
+              <a:rPr lang="en-US" b="1" dirty="0"/>
+              <a:t>Outcome: </a:t>
+            </a:r>
+            <a:r>
+              <a:rPr lang="en-US" dirty="0"/>
+              <a:t>a single correlation value, which tells you how well the current set of features predicted the data you’re interested in.</a:t>
+            </a:r>
+          </a:p>
+          <a:p>
+            <a:endParaRPr lang="en-US" b="1" dirty="0"/>
+          </a:p>
+          <a:p>
+            <a:r>
+              <a:rPr lang="en-US" b="1" dirty="0"/>
+              <a:t>Next step: statistical comparisons:</a:t>
+            </a:r>
+            <a:endParaRPr lang="en-US" dirty="0"/>
+          </a:p>
+          <a:p>
+            <a:r>
+              <a:rPr lang="en-US" dirty="0"/>
+              <a:t>…do these features predict the data better than chance? </a:t>
+            </a:r>
+            <a:r>
+              <a:rPr lang="en-US" dirty="0">
+                <a:sym typeface="Wingdings" panose="05000000000000000000" pitchFamily="2" charset="2"/>
+              </a:rPr>
+              <a:t> 1-sided Wilcoxon signed-rank test (non-parametric </a:t>
+            </a:r>
+            <a:r>
+              <a:rPr lang="en-US" i="1" dirty="0">
+                <a:sym typeface="Wingdings" panose="05000000000000000000" pitchFamily="2" charset="2"/>
+              </a:rPr>
+              <a:t>t</a:t>
+            </a:r>
+            <a:r>
+              <a:rPr lang="en-US" dirty="0">
+                <a:sym typeface="Wingdings" panose="05000000000000000000" pitchFamily="2" charset="2"/>
+              </a:rPr>
+              <a:t>-test)</a:t>
+            </a:r>
+            <a:endParaRPr lang="en-US" dirty="0"/>
+          </a:p>
+          <a:p>
+            <a:r>
+              <a:rPr lang="en-US" dirty="0"/>
+              <a:t>…do these features predict the data better than some alternative features? </a:t>
+            </a:r>
+            <a:r>
+              <a:rPr lang="en-US" dirty="0">
+                <a:sym typeface="Wingdings" panose="05000000000000000000" pitchFamily="2" charset="2"/>
+              </a:rPr>
+              <a:t> 2-sided Wilcoxon signed-rank test (non-parametric paired-samples t-test)</a:t>
+            </a:r>
+          </a:p>
+          <a:p>
+            <a:endParaRPr lang="en-US" dirty="0">
+              <a:sym typeface="Wingdings" panose="05000000000000000000" pitchFamily="2" charset="2"/>
+            </a:endParaRPr>
+          </a:p>
+          <a:p>
+            <a:r>
+              <a:rPr lang="en-US" b="1" dirty="0">
+                <a:sym typeface="Wingdings" panose="05000000000000000000" pitchFamily="2" charset="2"/>
+              </a:rPr>
+              <a:t>But first, you need some variance in the outcome:</a:t>
+            </a:r>
+          </a:p>
+          <a:p>
+            <a:r>
+              <a:rPr lang="en-US" dirty="0">
+                <a:sym typeface="Wingdings" panose="05000000000000000000" pitchFamily="2" charset="2"/>
+              </a:rPr>
+              <a:t>…you need a </a:t>
+            </a:r>
+            <a:r>
+              <a:rPr lang="en-US" i="1" dirty="0">
+                <a:sym typeface="Wingdings" panose="05000000000000000000" pitchFamily="2" charset="2"/>
+              </a:rPr>
+              <a:t>vector </a:t>
+            </a:r>
+            <a:r>
+              <a:rPr lang="en-US" dirty="0">
+                <a:sym typeface="Wingdings" panose="05000000000000000000" pitchFamily="2" charset="2"/>
+              </a:rPr>
+              <a:t>of outcomes, rather than a single outcome, to do the stats</a:t>
+            </a:r>
+          </a:p>
+          <a:p>
+            <a:r>
+              <a:rPr lang="en-US" dirty="0">
+                <a:sym typeface="Wingdings" panose="05000000000000000000" pitchFamily="2" charset="2"/>
+              </a:rPr>
+              <a:t>…the most common way to do this is to repeat this process for each subject  1 correlation value per sub</a:t>
+            </a:r>
+          </a:p>
+        </p:txBody>
+      </p:sp>
+    </p:spTree>
+    <p:extLst>
+      <p:ext uri="{BB962C8B-B14F-4D97-AF65-F5344CB8AC3E}">
+        <p14:creationId xmlns:p14="http://schemas.microsoft.com/office/powerpoint/2010/main" val="627013583"/>
+      </p:ext>
+    </p:extLst>
+  </p:cSld>
+  <p:clrMapOvr>
+    <a:masterClrMapping/>
+  </p:clrMapOvr>
+</p:sld>
+</file>
+
+<file path=ppt/slides/slide4.xml><?xml version="1.0" encoding="utf-8"?>
+<p:sld xmlns:a="http://schemas.openxmlformats.org/drawingml/2006/main" xmlns:r="http://schemas.openxmlformats.org/officeDocument/2006/relationships" xmlns:p="http://schemas.openxmlformats.org/presentationml/2006/main">
+  <p:cSld>
+    <p:spTree>
+      <p:nvGrpSpPr>
+        <p:cNvPr id="1" name=""/>
+        <p:cNvGrpSpPr/>
+        <p:nvPr/>
+      </p:nvGrpSpPr>
+      <p:grpSpPr>
+        <a:xfrm>
+          <a:off x="0" y="0"/>
+          <a:ext cx="0" cy="0"/>
+          <a:chOff x="0" y="0"/>
+          <a:chExt cx="0" cy="0"/>
+        </a:xfrm>
+      </p:grpSpPr>
+      <p:grpSp>
+        <p:nvGrpSpPr>
+          <p:cNvPr id="22" name="Group 21">
+            <a:extLst>
+              <a:ext uri="{FF2B5EF4-FFF2-40B4-BE49-F238E27FC236}">
+                <a16:creationId xmlns:a16="http://schemas.microsoft.com/office/drawing/2014/main" id="{0DBA3B62-F814-48A0-BBD1-53D81626BBC0}"/>
+              </a:ext>
+            </a:extLst>
+          </p:cNvPr>
+          <p:cNvGrpSpPr/>
+          <p:nvPr/>
+        </p:nvGrpSpPr>
+        <p:grpSpPr>
+          <a:xfrm>
+            <a:off x="489113" y="2002601"/>
+            <a:ext cx="3826594" cy="3435937"/>
+            <a:chOff x="463946" y="635194"/>
+            <a:chExt cx="3826594" cy="3435937"/>
+          </a:xfrm>
+        </p:grpSpPr>
+        <p:sp>
+          <p:nvSpPr>
+            <p:cNvPr id="5" name="Rectangle 4">
+              <a:extLst>
+                <a:ext uri="{FF2B5EF4-FFF2-40B4-BE49-F238E27FC236}">
+                  <a16:creationId xmlns:a16="http://schemas.microsoft.com/office/drawing/2014/main" id="{7A653748-046A-4329-AA2E-59912ECB1980}"/>
+                </a:ext>
+              </a:extLst>
+            </p:cNvPr>
+            <p:cNvSpPr/>
+            <p:nvPr/>
+          </p:nvSpPr>
+          <p:spPr>
+            <a:xfrm>
+              <a:off x="562062" y="635194"/>
+              <a:ext cx="100644" cy="2066544"/>
+            </a:xfrm>
+            <a:prstGeom prst="rect">
+              <a:avLst/>
+            </a:prstGeom>
+            <a:solidFill>
+              <a:srgbClr val="FF0000"/>
+            </a:solidFill>
+            <a:ln w="38100">
+              <a:solidFill>
+                <a:schemeClr val="tx1"/>
+              </a:solidFill>
+            </a:ln>
+          </p:spPr>
+          <p:style>
+            <a:lnRef idx="2">
+              <a:schemeClr val="accent1">
+                <a:shade val="50000"/>
+              </a:schemeClr>
+            </a:lnRef>
+            <a:fillRef idx="1">
+              <a:schemeClr val="accent1"/>
+            </a:fillRef>
+            <a:effectRef idx="0">
+              <a:schemeClr val="accent1"/>
+            </a:effectRef>
+            <a:fontRef idx="minor">
+              <a:schemeClr val="lt1"/>
+            </a:fontRef>
+          </p:style>
+          <p:txBody>
+            <a:bodyPr rtlCol="0" anchor="ctr"/>
+            <a:lstStyle/>
+            <a:p>
+              <a:pPr algn="ctr"/>
+              <a:endParaRPr lang="en-US"/>
+            </a:p>
+          </p:txBody>
+        </p:sp>
+        <p:sp>
+          <p:nvSpPr>
+            <p:cNvPr id="7" name="TextBox 6">
+              <a:extLst>
+                <a:ext uri="{FF2B5EF4-FFF2-40B4-BE49-F238E27FC236}">
+                  <a16:creationId xmlns:a16="http://schemas.microsoft.com/office/drawing/2014/main" id="{D5EB81D3-2511-44FA-A7F1-173F37FCD8C8}"/>
+                </a:ext>
+              </a:extLst>
+            </p:cNvPr>
+            <p:cNvSpPr txBox="1"/>
+            <p:nvPr/>
+          </p:nvSpPr>
+          <p:spPr>
+            <a:xfrm>
+              <a:off x="463946" y="3701799"/>
+              <a:ext cx="296876" cy="369332"/>
+            </a:xfrm>
+            <a:prstGeom prst="rect">
+              <a:avLst/>
+            </a:prstGeom>
+            <a:noFill/>
+          </p:spPr>
+          <p:txBody>
+            <a:bodyPr wrap="none" rtlCol="0">
+              <a:spAutoFit/>
+            </a:bodyPr>
+            <a:lstStyle/>
+            <a:p>
+              <a:r>
+                <a:rPr lang="en-US" dirty="0"/>
+                <a:t>Y</a:t>
+              </a:r>
+            </a:p>
+          </p:txBody>
+        </p:sp>
+        <p:sp>
+          <p:nvSpPr>
+            <p:cNvPr id="9" name="TextBox 8">
+              <a:extLst>
+                <a:ext uri="{FF2B5EF4-FFF2-40B4-BE49-F238E27FC236}">
+                  <a16:creationId xmlns:a16="http://schemas.microsoft.com/office/drawing/2014/main" id="{7B603198-3807-4211-BF69-2C67E83740C0}"/>
+                </a:ext>
+              </a:extLst>
+            </p:cNvPr>
+            <p:cNvSpPr txBox="1"/>
+            <p:nvPr/>
+          </p:nvSpPr>
+          <p:spPr>
+            <a:xfrm>
+              <a:off x="1030399" y="1773119"/>
+              <a:ext cx="300082" cy="369332"/>
+            </a:xfrm>
+            <a:prstGeom prst="rect">
+              <a:avLst/>
+            </a:prstGeom>
+            <a:noFill/>
+          </p:spPr>
+          <p:txBody>
+            <a:bodyPr wrap="none" rtlCol="0">
+              <a:spAutoFit/>
+            </a:bodyPr>
+            <a:lstStyle/>
+            <a:p>
+              <a:r>
+                <a:rPr lang="en-US" dirty="0"/>
+                <a:t>=</a:t>
+              </a:r>
+            </a:p>
+          </p:txBody>
+        </p:sp>
+        <p:sp>
+          <p:nvSpPr>
+            <p:cNvPr id="11" name="TextBox 10">
+              <a:extLst>
+                <a:ext uri="{FF2B5EF4-FFF2-40B4-BE49-F238E27FC236}">
+                  <a16:creationId xmlns:a16="http://schemas.microsoft.com/office/drawing/2014/main" id="{BCB9E659-60DC-48BA-B53C-F455E70A96FF}"/>
+                </a:ext>
+              </a:extLst>
+            </p:cNvPr>
+            <p:cNvSpPr txBox="1"/>
+            <p:nvPr/>
+          </p:nvSpPr>
+          <p:spPr>
+            <a:xfrm>
+              <a:off x="1946197" y="3694199"/>
+              <a:ext cx="383438" cy="369332"/>
+            </a:xfrm>
+            <a:prstGeom prst="rect">
+              <a:avLst/>
+            </a:prstGeom>
+            <a:noFill/>
+          </p:spPr>
+          <p:txBody>
+            <a:bodyPr wrap="none" rtlCol="0">
+              <a:spAutoFit/>
+            </a:bodyPr>
+            <a:lstStyle/>
+            <a:p>
+              <a:r>
+                <a:rPr lang="en-US" dirty="0"/>
+                <a:t>X</a:t>
+              </a:r>
+              <a:r>
+                <a:rPr lang="en-US" baseline="-25000" dirty="0"/>
+                <a:t>1</a:t>
+              </a:r>
+              <a:endParaRPr lang="en-US" dirty="0"/>
+            </a:p>
+          </p:txBody>
+        </p:sp>
+        <p:sp>
+          <p:nvSpPr>
+            <p:cNvPr id="13" name="TextBox 12">
+              <a:extLst>
+                <a:ext uri="{FF2B5EF4-FFF2-40B4-BE49-F238E27FC236}">
+                  <a16:creationId xmlns:a16="http://schemas.microsoft.com/office/drawing/2014/main" id="{08BEF9C0-7CF3-4449-88C2-D2DC67B82FC0}"/>
+                </a:ext>
+              </a:extLst>
+            </p:cNvPr>
+            <p:cNvSpPr txBox="1"/>
+            <p:nvPr/>
+          </p:nvSpPr>
+          <p:spPr>
+            <a:xfrm>
+              <a:off x="3298223" y="3701799"/>
+              <a:ext cx="383438" cy="369332"/>
+            </a:xfrm>
+            <a:prstGeom prst="rect">
+              <a:avLst/>
+            </a:prstGeom>
+            <a:noFill/>
+          </p:spPr>
+          <p:txBody>
+            <a:bodyPr wrap="none" rtlCol="0">
+              <a:spAutoFit/>
+            </a:bodyPr>
+            <a:lstStyle/>
+            <a:p>
+              <a:r>
+                <a:rPr lang="en-US" dirty="0"/>
+                <a:t>X</a:t>
+              </a:r>
+              <a:r>
+                <a:rPr lang="en-US" baseline="-25000" dirty="0"/>
+                <a:t>2</a:t>
+              </a:r>
+              <a:endParaRPr lang="en-US" dirty="0"/>
+            </a:p>
+          </p:txBody>
+        </p:sp>
+        <p:sp>
+          <p:nvSpPr>
+            <p:cNvPr id="15" name="TextBox 14">
+              <a:extLst>
+                <a:ext uri="{FF2B5EF4-FFF2-40B4-BE49-F238E27FC236}">
+                  <a16:creationId xmlns:a16="http://schemas.microsoft.com/office/drawing/2014/main" id="{063FFD2C-80B7-41D8-A605-06EBCD78FE6A}"/>
+                </a:ext>
+              </a:extLst>
+            </p:cNvPr>
+            <p:cNvSpPr txBox="1"/>
+            <p:nvPr/>
+          </p:nvSpPr>
+          <p:spPr>
+            <a:xfrm>
+              <a:off x="2234219" y="1705583"/>
+              <a:ext cx="688009" cy="369332"/>
+            </a:xfrm>
+            <a:prstGeom prst="rect">
+              <a:avLst/>
+            </a:prstGeom>
+            <a:noFill/>
+          </p:spPr>
+          <p:txBody>
+            <a:bodyPr wrap="none" rtlCol="0">
+              <a:spAutoFit/>
+            </a:bodyPr>
+            <a:lstStyle/>
+            <a:p>
+              <a:r>
+                <a:rPr lang="en-US" dirty="0"/>
+                <a:t>*β</a:t>
+              </a:r>
+              <a:r>
+                <a:rPr lang="en-US" baseline="-25000" dirty="0"/>
+                <a:t>1  </a:t>
+              </a:r>
+              <a:r>
+                <a:rPr lang="en-US" dirty="0"/>
+                <a:t>+</a:t>
+              </a:r>
+            </a:p>
+          </p:txBody>
+        </p:sp>
+        <p:sp>
+          <p:nvSpPr>
+            <p:cNvPr id="17" name="TextBox 16">
+              <a:extLst>
+                <a:ext uri="{FF2B5EF4-FFF2-40B4-BE49-F238E27FC236}">
+                  <a16:creationId xmlns:a16="http://schemas.microsoft.com/office/drawing/2014/main" id="{254835E7-C64E-43B2-B732-CE4DFA5B6EC2}"/>
+                </a:ext>
+              </a:extLst>
+            </p:cNvPr>
+            <p:cNvSpPr txBox="1"/>
+            <p:nvPr/>
+          </p:nvSpPr>
+          <p:spPr>
+            <a:xfrm>
+              <a:off x="3788479" y="1697194"/>
+              <a:ext cx="502061" cy="369332"/>
+            </a:xfrm>
+            <a:prstGeom prst="rect">
+              <a:avLst/>
+            </a:prstGeom>
+            <a:noFill/>
+          </p:spPr>
+          <p:txBody>
+            <a:bodyPr wrap="none" rtlCol="0">
+              <a:spAutoFit/>
+            </a:bodyPr>
+            <a:lstStyle/>
+            <a:p>
+              <a:r>
+                <a:rPr lang="en-US" dirty="0"/>
+                <a:t>*β</a:t>
+              </a:r>
+              <a:r>
+                <a:rPr lang="en-US" baseline="-25000" dirty="0"/>
+                <a:t>2</a:t>
+              </a:r>
+              <a:endParaRPr lang="en-US" dirty="0"/>
+            </a:p>
+          </p:txBody>
+        </p:sp>
+        <p:sp>
+          <p:nvSpPr>
+            <p:cNvPr id="19" name="Rectangle 18">
+              <a:extLst>
+                <a:ext uri="{FF2B5EF4-FFF2-40B4-BE49-F238E27FC236}">
+                  <a16:creationId xmlns:a16="http://schemas.microsoft.com/office/drawing/2014/main" id="{E0424B6B-B7CA-4BBF-ABAB-2D558BF494F9}"/>
+                </a:ext>
+              </a:extLst>
+            </p:cNvPr>
+            <p:cNvSpPr/>
+            <p:nvPr/>
+          </p:nvSpPr>
+          <p:spPr>
+            <a:xfrm>
+              <a:off x="2027596" y="635194"/>
+              <a:ext cx="100644" cy="2066544"/>
+            </a:xfrm>
+            <a:prstGeom prst="rect">
+              <a:avLst/>
+            </a:prstGeom>
+            <a:solidFill>
+              <a:srgbClr val="00B0F0"/>
+            </a:solidFill>
+            <a:ln w="38100">
+              <a:solidFill>
+                <a:schemeClr val="tx1"/>
+              </a:solidFill>
+            </a:ln>
+          </p:spPr>
+          <p:style>
+            <a:lnRef idx="2">
+              <a:schemeClr val="accent1">
+                <a:shade val="50000"/>
+              </a:schemeClr>
+            </a:lnRef>
+            <a:fillRef idx="1">
+              <a:schemeClr val="accent1"/>
+            </a:fillRef>
+            <a:effectRef idx="0">
+              <a:schemeClr val="accent1"/>
+            </a:effectRef>
+            <a:fontRef idx="minor">
+              <a:schemeClr val="lt1"/>
+            </a:fontRef>
+          </p:style>
+          <p:txBody>
+            <a:bodyPr rtlCol="0" anchor="ctr"/>
+            <a:lstStyle/>
+            <a:p>
+              <a:pPr algn="ctr"/>
+              <a:endParaRPr lang="en-US"/>
+            </a:p>
+          </p:txBody>
+        </p:sp>
+        <p:sp>
+          <p:nvSpPr>
+            <p:cNvPr id="21" name="Rectangle 20">
+              <a:extLst>
+                <a:ext uri="{FF2B5EF4-FFF2-40B4-BE49-F238E27FC236}">
+                  <a16:creationId xmlns:a16="http://schemas.microsoft.com/office/drawing/2014/main" id="{CEED22D1-21EC-48CA-9311-EBBAFB759654}"/>
+                </a:ext>
+              </a:extLst>
+            </p:cNvPr>
+            <p:cNvSpPr/>
+            <p:nvPr/>
+          </p:nvSpPr>
+          <p:spPr>
+            <a:xfrm>
+              <a:off x="3411653" y="635194"/>
+              <a:ext cx="100644" cy="2066544"/>
+            </a:xfrm>
+            <a:prstGeom prst="rect">
+              <a:avLst/>
+            </a:prstGeom>
+            <a:solidFill>
+              <a:srgbClr val="00B0F0"/>
+            </a:solidFill>
+            <a:ln w="38100">
+              <a:solidFill>
+                <a:schemeClr val="tx1"/>
+              </a:solidFill>
+            </a:ln>
+          </p:spPr>
+          <p:style>
+            <a:lnRef idx="2">
+              <a:schemeClr val="accent1">
+                <a:shade val="50000"/>
+              </a:schemeClr>
+            </a:lnRef>
+            <a:fillRef idx="1">
+              <a:schemeClr val="accent1"/>
+            </a:fillRef>
+            <a:effectRef idx="0">
+              <a:schemeClr val="accent1"/>
+            </a:effectRef>
+            <a:fontRef idx="minor">
+              <a:schemeClr val="lt1"/>
+            </a:fontRef>
+          </p:style>
+          <p:txBody>
+            <a:bodyPr rtlCol="0" anchor="ctr"/>
+            <a:lstStyle/>
+            <a:p>
+              <a:pPr algn="ctr"/>
+              <a:endParaRPr lang="en-US"/>
+            </a:p>
+          </p:txBody>
+        </p:sp>
+      </p:grpSp>
+      <p:sp>
+        <p:nvSpPr>
+          <p:cNvPr id="23" name="TextBox 22">
+            <a:extLst>
+              <a:ext uri="{FF2B5EF4-FFF2-40B4-BE49-F238E27FC236}">
+                <a16:creationId xmlns:a16="http://schemas.microsoft.com/office/drawing/2014/main" id="{797CD9AB-09AC-4436-BCB0-FB31943DAD82}"/>
+              </a:ext>
+            </a:extLst>
+          </p:cNvPr>
+          <p:cNvSpPr txBox="1"/>
+          <p:nvPr/>
+        </p:nvSpPr>
+        <p:spPr>
+          <a:xfrm>
+            <a:off x="100668" y="849320"/>
+            <a:ext cx="5824439" cy="923330"/>
+          </a:xfrm>
+          <a:prstGeom prst="rect">
+            <a:avLst/>
+          </a:prstGeom>
+          <a:noFill/>
+        </p:spPr>
+        <p:txBody>
+          <a:bodyPr wrap="square" rtlCol="0">
+            <a:spAutoFit/>
+          </a:bodyPr>
+          <a:lstStyle/>
+          <a:p>
+            <a:pPr marL="342900" indent="-342900">
+              <a:buAutoNum type="arabicPeriod"/>
+            </a:pPr>
+            <a:r>
+              <a:rPr lang="en-US" b="1" dirty="0"/>
+              <a:t>Loop through the items (actions). </a:t>
+            </a:r>
+          </a:p>
+          <a:p>
+            <a:r>
+              <a:rPr lang="en-US" dirty="0"/>
+              <a:t>1a. For every action, hold out all the pairs that involve that action (59/1770)</a:t>
+            </a:r>
+          </a:p>
+        </p:txBody>
+      </p:sp>
+      <p:sp>
+        <p:nvSpPr>
+          <p:cNvPr id="25" name="Rectangle 24">
+            <a:extLst>
+              <a:ext uri="{FF2B5EF4-FFF2-40B4-BE49-F238E27FC236}">
+                <a16:creationId xmlns:a16="http://schemas.microsoft.com/office/drawing/2014/main" id="{C96BD9FB-C0F9-475A-8E9E-DC2B493C168B}"/>
+              </a:ext>
+            </a:extLst>
+          </p:cNvPr>
+          <p:cNvSpPr/>
+          <p:nvPr/>
+        </p:nvSpPr>
+        <p:spPr>
+          <a:xfrm>
+            <a:off x="587229" y="4374860"/>
+            <a:ext cx="100644" cy="457200"/>
+          </a:xfrm>
+          <a:prstGeom prst="rect">
+            <a:avLst/>
+          </a:prstGeom>
+          <a:solidFill>
+            <a:srgbClr val="FF0000"/>
+          </a:solidFill>
+          <a:ln w="38100">
+            <a:solidFill>
+              <a:schemeClr val="tx1"/>
+            </a:solidFill>
+          </a:ln>
+        </p:spPr>
+        <p:style>
+          <a:lnRef idx="2">
+            <a:schemeClr val="accent1">
+              <a:shade val="50000"/>
+            </a:schemeClr>
+          </a:lnRef>
+          <a:fillRef idx="1">
+            <a:schemeClr val="accent1"/>
+          </a:fillRef>
+          <a:effectRef idx="0">
+            <a:schemeClr val="accent1"/>
+          </a:effectRef>
+          <a:fontRef idx="minor">
+            <a:schemeClr val="lt1"/>
+          </a:fontRef>
+        </p:style>
+        <p:txBody>
+          <a:bodyPr rtlCol="0" anchor="ctr"/>
+          <a:lstStyle/>
+          <a:p>
+            <a:pPr algn="ctr"/>
+            <a:endParaRPr lang="en-US"/>
+          </a:p>
+        </p:txBody>
+      </p:sp>
+      <p:sp>
+        <p:nvSpPr>
+          <p:cNvPr id="27" name="Rectangle 26">
+            <a:extLst>
+              <a:ext uri="{FF2B5EF4-FFF2-40B4-BE49-F238E27FC236}">
+                <a16:creationId xmlns:a16="http://schemas.microsoft.com/office/drawing/2014/main" id="{7704C41B-3618-4581-965A-5273B5BC5469}"/>
+              </a:ext>
+            </a:extLst>
+          </p:cNvPr>
+          <p:cNvSpPr/>
+          <p:nvPr/>
+        </p:nvSpPr>
+        <p:spPr>
+          <a:xfrm>
+            <a:off x="2058576" y="4374860"/>
+            <a:ext cx="100644" cy="457200"/>
+          </a:xfrm>
+          <a:prstGeom prst="rect">
+            <a:avLst/>
+          </a:prstGeom>
+          <a:solidFill>
+            <a:srgbClr val="00B0F0"/>
+          </a:solidFill>
+          <a:ln w="38100">
+            <a:solidFill>
+              <a:schemeClr val="tx1"/>
+            </a:solidFill>
+          </a:ln>
+        </p:spPr>
+        <p:style>
+          <a:lnRef idx="2">
+            <a:schemeClr val="accent1">
+              <a:shade val="50000"/>
+            </a:schemeClr>
+          </a:lnRef>
+          <a:fillRef idx="1">
+            <a:schemeClr val="accent1"/>
+          </a:fillRef>
+          <a:effectRef idx="0">
+            <a:schemeClr val="accent1"/>
+          </a:effectRef>
+          <a:fontRef idx="minor">
+            <a:schemeClr val="lt1"/>
+          </a:fontRef>
+        </p:style>
+        <p:txBody>
+          <a:bodyPr rtlCol="0" anchor="ctr"/>
+          <a:lstStyle/>
+          <a:p>
+            <a:pPr algn="ctr"/>
+            <a:endParaRPr lang="en-US"/>
+          </a:p>
+        </p:txBody>
+      </p:sp>
+      <p:sp>
+        <p:nvSpPr>
+          <p:cNvPr id="29" name="Rectangle 28">
+            <a:extLst>
+              <a:ext uri="{FF2B5EF4-FFF2-40B4-BE49-F238E27FC236}">
+                <a16:creationId xmlns:a16="http://schemas.microsoft.com/office/drawing/2014/main" id="{475D76A7-9373-4504-B242-1974410ED8B8}"/>
+              </a:ext>
+            </a:extLst>
+          </p:cNvPr>
+          <p:cNvSpPr/>
+          <p:nvPr/>
+        </p:nvSpPr>
+        <p:spPr>
+          <a:xfrm>
+            <a:off x="3436820" y="4332186"/>
+            <a:ext cx="100644" cy="457200"/>
+          </a:xfrm>
+          <a:prstGeom prst="rect">
+            <a:avLst/>
+          </a:prstGeom>
+          <a:solidFill>
+            <a:srgbClr val="00B0F0"/>
+          </a:solidFill>
+          <a:ln w="38100">
+            <a:solidFill>
+              <a:schemeClr val="tx1"/>
+            </a:solidFill>
+          </a:ln>
+        </p:spPr>
+        <p:style>
+          <a:lnRef idx="2">
+            <a:schemeClr val="accent1">
+              <a:shade val="50000"/>
+            </a:schemeClr>
+          </a:lnRef>
+          <a:fillRef idx="1">
+            <a:schemeClr val="accent1"/>
+          </a:fillRef>
+          <a:effectRef idx="0">
+            <a:schemeClr val="accent1"/>
+          </a:effectRef>
+          <a:fontRef idx="minor">
+            <a:schemeClr val="lt1"/>
+          </a:fontRef>
+        </p:style>
+        <p:txBody>
+          <a:bodyPr rtlCol="0" anchor="ctr"/>
+          <a:lstStyle/>
+          <a:p>
+            <a:pPr algn="ctr"/>
+            <a:endParaRPr lang="en-US"/>
+          </a:p>
+        </p:txBody>
+      </p:sp>
+      <p:sp>
+        <p:nvSpPr>
+          <p:cNvPr id="30" name="TextBox 29">
+            <a:extLst>
+              <a:ext uri="{FF2B5EF4-FFF2-40B4-BE49-F238E27FC236}">
+                <a16:creationId xmlns:a16="http://schemas.microsoft.com/office/drawing/2014/main" id="{1DBEC7D3-E32B-4024-B296-D64036A68D1D}"/>
+              </a:ext>
+            </a:extLst>
+          </p:cNvPr>
+          <p:cNvSpPr txBox="1"/>
+          <p:nvPr/>
+        </p:nvSpPr>
+        <p:spPr>
+          <a:xfrm>
+            <a:off x="4408625" y="4374860"/>
+            <a:ext cx="1555947" cy="646331"/>
+          </a:xfrm>
+          <a:prstGeom prst="rect">
+            <a:avLst/>
+          </a:prstGeom>
+          <a:noFill/>
+        </p:spPr>
+        <p:txBody>
+          <a:bodyPr wrap="square" rtlCol="0">
+            <a:spAutoFit/>
+          </a:bodyPr>
+          <a:lstStyle/>
+          <a:p>
+            <a:r>
+              <a:rPr lang="en-US" i="1" dirty="0"/>
+              <a:t>Held-out data for this round</a:t>
+            </a:r>
+          </a:p>
+        </p:txBody>
+      </p:sp>
+      <p:cxnSp>
+        <p:nvCxnSpPr>
+          <p:cNvPr id="32" name="Straight Arrow Connector 31">
+            <a:extLst>
+              <a:ext uri="{FF2B5EF4-FFF2-40B4-BE49-F238E27FC236}">
+                <a16:creationId xmlns:a16="http://schemas.microsoft.com/office/drawing/2014/main" id="{4F6FAAE7-A150-4DDF-897A-75F15E054F6B}"/>
+              </a:ext>
+            </a:extLst>
+          </p:cNvPr>
+          <p:cNvCxnSpPr>
+            <a:cxnSpLocks/>
+            <a:stCxn id="30" idx="1"/>
+          </p:cNvCxnSpPr>
+          <p:nvPr/>
+        </p:nvCxnSpPr>
+        <p:spPr>
+          <a:xfrm flipH="1" flipV="1">
+            <a:off x="3744775" y="4559526"/>
+            <a:ext cx="663850" cy="138500"/>
+          </a:xfrm>
+          <a:prstGeom prst="straightConnector1">
+            <a:avLst/>
+          </a:prstGeom>
+          <a:ln>
+            <a:tailEnd type="triangle"/>
+          </a:ln>
+        </p:spPr>
+        <p:style>
+          <a:lnRef idx="1">
+            <a:schemeClr val="dk1"/>
+          </a:lnRef>
+          <a:fillRef idx="0">
+            <a:schemeClr val="dk1"/>
+          </a:fillRef>
+          <a:effectRef idx="0">
+            <a:schemeClr val="dk1"/>
+          </a:effectRef>
+          <a:fontRef idx="minor">
+            <a:schemeClr val="tx1"/>
+          </a:fontRef>
+        </p:style>
+      </p:cxnSp>
+      <p:sp>
+        <p:nvSpPr>
+          <p:cNvPr id="33" name="TextBox 32">
+            <a:extLst>
+              <a:ext uri="{FF2B5EF4-FFF2-40B4-BE49-F238E27FC236}">
+                <a16:creationId xmlns:a16="http://schemas.microsoft.com/office/drawing/2014/main" id="{B2C26496-08C4-4DD4-9F4B-7F4B074AE559}"/>
+              </a:ext>
+            </a:extLst>
+          </p:cNvPr>
+          <p:cNvSpPr txBox="1"/>
+          <p:nvPr/>
+        </p:nvSpPr>
+        <p:spPr>
+          <a:xfrm>
+            <a:off x="285577" y="5634487"/>
+            <a:ext cx="5172634" cy="646331"/>
+          </a:xfrm>
+          <a:prstGeom prst="rect">
+            <a:avLst/>
+          </a:prstGeom>
+          <a:noFill/>
+        </p:spPr>
+        <p:txBody>
+          <a:bodyPr wrap="none" rtlCol="0">
+            <a:spAutoFit/>
+          </a:bodyPr>
+          <a:lstStyle/>
+          <a:p>
+            <a:r>
+              <a:rPr lang="en-US" dirty="0"/>
+              <a:t>1b. Fit the model on the remaining pairs (1711/1700)</a:t>
+            </a:r>
+          </a:p>
+          <a:p>
+            <a:r>
+              <a:rPr lang="en-US" dirty="0">
+                <a:sym typeface="Wingdings" panose="05000000000000000000" pitchFamily="2" charset="2"/>
+              </a:rPr>
+              <a:t> This gives you the weights for each predictor</a:t>
+            </a:r>
+            <a:endParaRPr lang="en-US" dirty="0"/>
+          </a:p>
+        </p:txBody>
+      </p:sp>
+      <p:sp>
+        <p:nvSpPr>
+          <p:cNvPr id="35" name="TextBox 34">
+            <a:extLst>
+              <a:ext uri="{FF2B5EF4-FFF2-40B4-BE49-F238E27FC236}">
+                <a16:creationId xmlns:a16="http://schemas.microsoft.com/office/drawing/2014/main" id="{C7023C8A-BCA0-411F-9B85-235DEA567653}"/>
+              </a:ext>
+            </a:extLst>
+          </p:cNvPr>
+          <p:cNvSpPr txBox="1"/>
+          <p:nvPr/>
+        </p:nvSpPr>
+        <p:spPr>
+          <a:xfrm>
+            <a:off x="6432137" y="828141"/>
+            <a:ext cx="5344155" cy="369332"/>
+          </a:xfrm>
+          <a:prstGeom prst="rect">
+            <a:avLst/>
+          </a:prstGeom>
+          <a:noFill/>
+        </p:spPr>
+        <p:txBody>
+          <a:bodyPr wrap="none" rtlCol="0">
+            <a:spAutoFit/>
+          </a:bodyPr>
+          <a:lstStyle/>
+          <a:p>
+            <a:r>
+              <a:rPr lang="en-US" dirty="0"/>
+              <a:t>1c. Get the </a:t>
+            </a:r>
+            <a:r>
+              <a:rPr lang="en-US" b="1" dirty="0"/>
+              <a:t>predicted Y-values </a:t>
+            </a:r>
+            <a:r>
+              <a:rPr lang="en-US" dirty="0"/>
+              <a:t>(Ŷ) for the held-out data</a:t>
+            </a:r>
+          </a:p>
+        </p:txBody>
+      </p:sp>
+      <p:sp>
+        <p:nvSpPr>
+          <p:cNvPr id="38" name="Rectangle 37">
+            <a:extLst>
+              <a:ext uri="{FF2B5EF4-FFF2-40B4-BE49-F238E27FC236}">
+                <a16:creationId xmlns:a16="http://schemas.microsoft.com/office/drawing/2014/main" id="{2F34939A-DB9B-4777-8E09-86C6925E1067}"/>
+              </a:ext>
+            </a:extLst>
+          </p:cNvPr>
+          <p:cNvSpPr/>
+          <p:nvPr/>
+        </p:nvSpPr>
+        <p:spPr>
+          <a:xfrm>
+            <a:off x="6712591" y="1531453"/>
+            <a:ext cx="100644" cy="457200"/>
+          </a:xfrm>
+          <a:prstGeom prst="rect">
+            <a:avLst/>
+          </a:prstGeom>
+          <a:solidFill>
+            <a:srgbClr val="FF0000"/>
+          </a:solidFill>
+          <a:ln w="38100">
+            <a:solidFill>
+              <a:schemeClr val="bg1">
+                <a:lumMod val="65000"/>
+              </a:schemeClr>
+            </a:solidFill>
+          </a:ln>
+        </p:spPr>
+        <p:style>
+          <a:lnRef idx="2">
+            <a:schemeClr val="accent1">
+              <a:shade val="50000"/>
+            </a:schemeClr>
+          </a:lnRef>
+          <a:fillRef idx="1">
+            <a:schemeClr val="accent1"/>
+          </a:fillRef>
+          <a:effectRef idx="0">
+            <a:schemeClr val="accent1"/>
+          </a:effectRef>
+          <a:fontRef idx="minor">
+            <a:schemeClr val="lt1"/>
+          </a:fontRef>
+        </p:style>
+        <p:txBody>
+          <a:bodyPr rtlCol="0" anchor="ctr"/>
+          <a:lstStyle/>
+          <a:p>
+            <a:pPr algn="ctr"/>
+            <a:endParaRPr lang="en-US"/>
+          </a:p>
+        </p:txBody>
+      </p:sp>
+      <p:sp>
+        <p:nvSpPr>
+          <p:cNvPr id="40" name="TextBox 39">
+            <a:extLst>
+              <a:ext uri="{FF2B5EF4-FFF2-40B4-BE49-F238E27FC236}">
+                <a16:creationId xmlns:a16="http://schemas.microsoft.com/office/drawing/2014/main" id="{F23E9C74-E419-4877-91F5-48668CAE675A}"/>
+              </a:ext>
+            </a:extLst>
+          </p:cNvPr>
+          <p:cNvSpPr txBox="1"/>
+          <p:nvPr/>
+        </p:nvSpPr>
+        <p:spPr>
+          <a:xfrm>
+            <a:off x="5925107" y="2083196"/>
+            <a:ext cx="1776255" cy="646331"/>
+          </a:xfrm>
+          <a:prstGeom prst="rect">
+            <a:avLst/>
+          </a:prstGeom>
+          <a:noFill/>
+        </p:spPr>
+        <p:txBody>
+          <a:bodyPr wrap="none" rtlCol="0">
+            <a:spAutoFit/>
+          </a:bodyPr>
+          <a:lstStyle/>
+          <a:p>
+            <a:pPr algn="ctr"/>
+            <a:r>
+              <a:rPr lang="en-US" dirty="0"/>
+              <a:t>Ŷ </a:t>
+            </a:r>
+          </a:p>
+          <a:p>
+            <a:pPr algn="ctr"/>
+            <a:r>
+              <a:rPr lang="en-US" dirty="0"/>
+              <a:t>for held-out data</a:t>
+            </a:r>
+          </a:p>
+        </p:txBody>
+      </p:sp>
+      <p:sp>
+        <p:nvSpPr>
+          <p:cNvPr id="41" name="TextBox 40">
+            <a:extLst>
+              <a:ext uri="{FF2B5EF4-FFF2-40B4-BE49-F238E27FC236}">
+                <a16:creationId xmlns:a16="http://schemas.microsoft.com/office/drawing/2014/main" id="{6E9FCCD6-E232-41C7-86B2-C15A6B5629DD}"/>
+              </a:ext>
+            </a:extLst>
+          </p:cNvPr>
+          <p:cNvSpPr txBox="1"/>
+          <p:nvPr/>
+        </p:nvSpPr>
+        <p:spPr>
+          <a:xfrm>
+            <a:off x="7531812" y="1575387"/>
+            <a:ext cx="300082" cy="369332"/>
+          </a:xfrm>
+          <a:prstGeom prst="rect">
+            <a:avLst/>
+          </a:prstGeom>
+          <a:noFill/>
+        </p:spPr>
+        <p:txBody>
+          <a:bodyPr wrap="none" rtlCol="0">
+            <a:spAutoFit/>
+          </a:bodyPr>
+          <a:lstStyle/>
+          <a:p>
+            <a:r>
+              <a:rPr lang="en-US" dirty="0"/>
+              <a:t>=</a:t>
+            </a:r>
+          </a:p>
+        </p:txBody>
+      </p:sp>
+      <p:sp>
+        <p:nvSpPr>
+          <p:cNvPr id="43" name="Rectangle 42">
+            <a:extLst>
+              <a:ext uri="{FF2B5EF4-FFF2-40B4-BE49-F238E27FC236}">
+                <a16:creationId xmlns:a16="http://schemas.microsoft.com/office/drawing/2014/main" id="{3DED10B7-01AF-4E1C-9E52-870274D57F62}"/>
+              </a:ext>
+            </a:extLst>
+          </p:cNvPr>
+          <p:cNvSpPr/>
+          <p:nvPr/>
+        </p:nvSpPr>
+        <p:spPr>
+          <a:xfrm>
+            <a:off x="8183937" y="1541831"/>
+            <a:ext cx="100644" cy="457200"/>
+          </a:xfrm>
+          <a:prstGeom prst="rect">
+            <a:avLst/>
+          </a:prstGeom>
+          <a:solidFill>
+            <a:srgbClr val="00B0F0"/>
+          </a:solidFill>
+          <a:ln w="38100">
+            <a:solidFill>
+              <a:schemeClr val="tx1"/>
+            </a:solidFill>
+          </a:ln>
+        </p:spPr>
+        <p:style>
+          <a:lnRef idx="2">
+            <a:schemeClr val="accent1">
+              <a:shade val="50000"/>
+            </a:schemeClr>
+          </a:lnRef>
+          <a:fillRef idx="1">
+            <a:schemeClr val="accent1"/>
+          </a:fillRef>
+          <a:effectRef idx="0">
+            <a:schemeClr val="accent1"/>
+          </a:effectRef>
+          <a:fontRef idx="minor">
+            <a:schemeClr val="lt1"/>
+          </a:fontRef>
+        </p:style>
+        <p:txBody>
+          <a:bodyPr rtlCol="0" anchor="ctr"/>
+          <a:lstStyle/>
+          <a:p>
+            <a:pPr algn="ctr"/>
+            <a:endParaRPr lang="en-US"/>
+          </a:p>
+        </p:txBody>
+      </p:sp>
+      <p:sp>
+        <p:nvSpPr>
+          <p:cNvPr id="45" name="TextBox 44">
+            <a:extLst>
+              <a:ext uri="{FF2B5EF4-FFF2-40B4-BE49-F238E27FC236}">
+                <a16:creationId xmlns:a16="http://schemas.microsoft.com/office/drawing/2014/main" id="{A205D0AF-DB74-4D1E-9398-4977E2860C85}"/>
+              </a:ext>
+            </a:extLst>
+          </p:cNvPr>
+          <p:cNvSpPr txBox="1"/>
+          <p:nvPr/>
+        </p:nvSpPr>
+        <p:spPr>
+          <a:xfrm>
+            <a:off x="8277426" y="1575387"/>
+            <a:ext cx="572593" cy="369332"/>
+          </a:xfrm>
+          <a:prstGeom prst="rect">
+            <a:avLst/>
+          </a:prstGeom>
+          <a:noFill/>
+        </p:spPr>
+        <p:txBody>
+          <a:bodyPr wrap="none" rtlCol="0">
+            <a:spAutoFit/>
+          </a:bodyPr>
+          <a:lstStyle/>
+          <a:p>
+            <a:r>
+              <a:rPr lang="en-US" dirty="0"/>
+              <a:t>*β</a:t>
+            </a:r>
+            <a:r>
+              <a:rPr lang="en-US" baseline="-25000" dirty="0"/>
+              <a:t>1  </a:t>
+            </a:r>
+            <a:endParaRPr lang="en-US" dirty="0"/>
+          </a:p>
+        </p:txBody>
+      </p:sp>
+      <p:sp>
+        <p:nvSpPr>
+          <p:cNvPr id="47" name="Rectangle 46">
+            <a:extLst>
+              <a:ext uri="{FF2B5EF4-FFF2-40B4-BE49-F238E27FC236}">
+                <a16:creationId xmlns:a16="http://schemas.microsoft.com/office/drawing/2014/main" id="{941D80E4-D2C3-47E4-A2ED-CC7E5A9888A2}"/>
+              </a:ext>
+            </a:extLst>
+          </p:cNvPr>
+          <p:cNvSpPr/>
+          <p:nvPr/>
+        </p:nvSpPr>
+        <p:spPr>
+          <a:xfrm>
+            <a:off x="10139237" y="1541831"/>
+            <a:ext cx="100644" cy="457200"/>
+          </a:xfrm>
+          <a:prstGeom prst="rect">
+            <a:avLst/>
+          </a:prstGeom>
+          <a:solidFill>
+            <a:srgbClr val="00B0F0"/>
+          </a:solidFill>
+          <a:ln w="38100">
+            <a:solidFill>
+              <a:schemeClr val="tx1"/>
+            </a:solidFill>
+          </a:ln>
+        </p:spPr>
+        <p:style>
+          <a:lnRef idx="2">
+            <a:schemeClr val="accent1">
+              <a:shade val="50000"/>
+            </a:schemeClr>
+          </a:lnRef>
+          <a:fillRef idx="1">
+            <a:schemeClr val="accent1"/>
+          </a:fillRef>
+          <a:effectRef idx="0">
+            <a:schemeClr val="accent1"/>
+          </a:effectRef>
+          <a:fontRef idx="minor">
+            <a:schemeClr val="lt1"/>
+          </a:fontRef>
+        </p:style>
+        <p:txBody>
+          <a:bodyPr rtlCol="0" anchor="ctr"/>
+          <a:lstStyle/>
+          <a:p>
+            <a:pPr algn="ctr"/>
+            <a:endParaRPr lang="en-US"/>
+          </a:p>
+        </p:txBody>
+      </p:sp>
+      <p:sp>
+        <p:nvSpPr>
+          <p:cNvPr id="49" name="TextBox 48">
+            <a:extLst>
+              <a:ext uri="{FF2B5EF4-FFF2-40B4-BE49-F238E27FC236}">
+                <a16:creationId xmlns:a16="http://schemas.microsoft.com/office/drawing/2014/main" id="{EA271539-DDA1-4041-98E6-C7FD0A645FD4}"/>
+              </a:ext>
+            </a:extLst>
+          </p:cNvPr>
+          <p:cNvSpPr txBox="1"/>
+          <p:nvPr/>
+        </p:nvSpPr>
+        <p:spPr>
+          <a:xfrm>
+            <a:off x="10227426" y="1557157"/>
+            <a:ext cx="502061" cy="369332"/>
+          </a:xfrm>
+          <a:prstGeom prst="rect">
+            <a:avLst/>
+          </a:prstGeom>
+          <a:noFill/>
+        </p:spPr>
+        <p:txBody>
+          <a:bodyPr wrap="none" rtlCol="0">
+            <a:spAutoFit/>
+          </a:bodyPr>
+          <a:lstStyle/>
+          <a:p>
+            <a:r>
+              <a:rPr lang="en-US" dirty="0"/>
+              <a:t>*β</a:t>
+            </a:r>
+            <a:r>
+              <a:rPr lang="en-US" baseline="-25000" dirty="0"/>
+              <a:t>2</a:t>
+            </a:r>
+            <a:endParaRPr lang="en-US" dirty="0"/>
+          </a:p>
+        </p:txBody>
+      </p:sp>
+      <p:sp>
+        <p:nvSpPr>
+          <p:cNvPr id="51" name="TextBox 50">
+            <a:extLst>
+              <a:ext uri="{FF2B5EF4-FFF2-40B4-BE49-F238E27FC236}">
+                <a16:creationId xmlns:a16="http://schemas.microsoft.com/office/drawing/2014/main" id="{D534A462-B748-4A52-98DA-3953169BD622}"/>
+              </a:ext>
+            </a:extLst>
+          </p:cNvPr>
+          <p:cNvSpPr txBox="1"/>
+          <p:nvPr/>
+        </p:nvSpPr>
+        <p:spPr>
+          <a:xfrm>
+            <a:off x="7841235" y="2083196"/>
+            <a:ext cx="1825243" cy="830997"/>
+          </a:xfrm>
+          <a:prstGeom prst="rect">
+            <a:avLst/>
+          </a:prstGeom>
+          <a:noFill/>
+        </p:spPr>
+        <p:txBody>
+          <a:bodyPr wrap="none" rtlCol="0">
+            <a:spAutoFit/>
+          </a:bodyPr>
+          <a:lstStyle/>
+          <a:p>
+            <a:pPr algn="ctr"/>
+            <a:r>
+              <a:rPr lang="en-US" dirty="0"/>
+              <a:t>X</a:t>
+            </a:r>
+            <a:r>
+              <a:rPr lang="en-US" baseline="-25000" dirty="0"/>
+              <a:t>1</a:t>
+            </a:r>
+          </a:p>
+          <a:p>
+            <a:pPr algn="ctr"/>
+            <a:r>
+              <a:rPr lang="en-US" dirty="0"/>
+              <a:t>for held-out data</a:t>
+            </a:r>
+          </a:p>
+          <a:p>
+            <a:endParaRPr lang="en-US" baseline="-25000" dirty="0"/>
+          </a:p>
+        </p:txBody>
+      </p:sp>
+      <p:cxnSp>
+        <p:nvCxnSpPr>
+          <p:cNvPr id="53" name="Straight Arrow Connector 52">
+            <a:extLst>
+              <a:ext uri="{FF2B5EF4-FFF2-40B4-BE49-F238E27FC236}">
+                <a16:creationId xmlns:a16="http://schemas.microsoft.com/office/drawing/2014/main" id="{1DC0C3C4-5DAB-4302-B2B4-8A4B97959D89}"/>
+              </a:ext>
+            </a:extLst>
+          </p:cNvPr>
+          <p:cNvCxnSpPr/>
+          <p:nvPr/>
+        </p:nvCxnSpPr>
+        <p:spPr>
+          <a:xfrm flipH="1" flipV="1">
+            <a:off x="8284581" y="2083196"/>
+            <a:ext cx="263801" cy="176277"/>
+          </a:xfrm>
+          <a:prstGeom prst="straightConnector1">
+            <a:avLst/>
+          </a:prstGeom>
+          <a:ln>
+            <a:tailEnd type="triangle"/>
+          </a:ln>
+        </p:spPr>
+        <p:style>
+          <a:lnRef idx="1">
+            <a:schemeClr val="dk1"/>
+          </a:lnRef>
+          <a:fillRef idx="0">
+            <a:schemeClr val="dk1"/>
+          </a:fillRef>
+          <a:effectRef idx="0">
+            <a:schemeClr val="dk1"/>
+          </a:effectRef>
+          <a:fontRef idx="minor">
+            <a:schemeClr val="tx1"/>
+          </a:fontRef>
+        </p:style>
+      </p:cxnSp>
+      <p:sp>
+        <p:nvSpPr>
+          <p:cNvPr id="55" name="TextBox 54">
+            <a:extLst>
+              <a:ext uri="{FF2B5EF4-FFF2-40B4-BE49-F238E27FC236}">
+                <a16:creationId xmlns:a16="http://schemas.microsoft.com/office/drawing/2014/main" id="{B956049C-CE27-481C-84C0-B31633914DD1}"/>
+              </a:ext>
+            </a:extLst>
+          </p:cNvPr>
+          <p:cNvSpPr txBox="1"/>
+          <p:nvPr/>
+        </p:nvSpPr>
+        <p:spPr>
+          <a:xfrm>
+            <a:off x="9816865" y="2141420"/>
+            <a:ext cx="1825243" cy="830997"/>
+          </a:xfrm>
+          <a:prstGeom prst="rect">
+            <a:avLst/>
+          </a:prstGeom>
+          <a:noFill/>
+        </p:spPr>
+        <p:txBody>
+          <a:bodyPr wrap="none" rtlCol="0">
+            <a:spAutoFit/>
+          </a:bodyPr>
+          <a:lstStyle/>
+          <a:p>
+            <a:pPr algn="ctr"/>
+            <a:r>
+              <a:rPr lang="en-US" dirty="0"/>
+              <a:t>X</a:t>
+            </a:r>
+            <a:r>
+              <a:rPr lang="en-US" baseline="-25000" dirty="0"/>
+              <a:t>2</a:t>
+            </a:r>
+          </a:p>
+          <a:p>
+            <a:pPr algn="ctr"/>
+            <a:r>
+              <a:rPr lang="en-US" dirty="0"/>
+              <a:t>for held-out data</a:t>
+            </a:r>
+          </a:p>
+          <a:p>
+            <a:endParaRPr lang="en-US" baseline="-25000" dirty="0"/>
+          </a:p>
+        </p:txBody>
+      </p:sp>
+      <p:cxnSp>
+        <p:nvCxnSpPr>
+          <p:cNvPr id="56" name="Straight Arrow Connector 55">
+            <a:extLst>
+              <a:ext uri="{FF2B5EF4-FFF2-40B4-BE49-F238E27FC236}">
+                <a16:creationId xmlns:a16="http://schemas.microsoft.com/office/drawing/2014/main" id="{987B0FF5-AED6-4B69-9355-E0177A142941}"/>
+              </a:ext>
+            </a:extLst>
+          </p:cNvPr>
+          <p:cNvCxnSpPr/>
+          <p:nvPr/>
+        </p:nvCxnSpPr>
+        <p:spPr>
+          <a:xfrm flipH="1" flipV="1">
+            <a:off x="10239881" y="2125823"/>
+            <a:ext cx="263801" cy="176277"/>
+          </a:xfrm>
+          <a:prstGeom prst="straightConnector1">
+            <a:avLst/>
+          </a:prstGeom>
+          <a:ln>
+            <a:tailEnd type="triangle"/>
+          </a:ln>
+        </p:spPr>
+        <p:style>
+          <a:lnRef idx="1">
+            <a:schemeClr val="dk1"/>
+          </a:lnRef>
+          <a:fillRef idx="0">
+            <a:schemeClr val="dk1"/>
+          </a:fillRef>
+          <a:effectRef idx="0">
+            <a:schemeClr val="dk1"/>
+          </a:effectRef>
+          <a:fontRef idx="minor">
+            <a:schemeClr val="tx1"/>
+          </a:fontRef>
+        </p:style>
+      </p:cxnSp>
+      <p:sp>
+        <p:nvSpPr>
+          <p:cNvPr id="57" name="TextBox 56">
+            <a:extLst>
+              <a:ext uri="{FF2B5EF4-FFF2-40B4-BE49-F238E27FC236}">
+                <a16:creationId xmlns:a16="http://schemas.microsoft.com/office/drawing/2014/main" id="{9707D5B8-5B42-4B81-B106-3487A18418A0}"/>
+              </a:ext>
+            </a:extLst>
+          </p:cNvPr>
+          <p:cNvSpPr txBox="1"/>
+          <p:nvPr/>
+        </p:nvSpPr>
+        <p:spPr>
+          <a:xfrm>
+            <a:off x="9286613" y="1677798"/>
+            <a:ext cx="300082" cy="369332"/>
+          </a:xfrm>
+          <a:prstGeom prst="rect">
+            <a:avLst/>
+          </a:prstGeom>
+          <a:noFill/>
+        </p:spPr>
+        <p:txBody>
+          <a:bodyPr wrap="none" rtlCol="0">
+            <a:spAutoFit/>
+          </a:bodyPr>
+          <a:lstStyle/>
+          <a:p>
+            <a:r>
+              <a:rPr lang="en-US" dirty="0"/>
+              <a:t>+</a:t>
+            </a:r>
+          </a:p>
+        </p:txBody>
+      </p:sp>
+      <p:sp>
+        <p:nvSpPr>
+          <p:cNvPr id="61" name="TextBox 60">
+            <a:extLst>
+              <a:ext uri="{FF2B5EF4-FFF2-40B4-BE49-F238E27FC236}">
+                <a16:creationId xmlns:a16="http://schemas.microsoft.com/office/drawing/2014/main" id="{D3A2B3F2-BB49-40CA-9368-D846049541BA}"/>
+              </a:ext>
+            </a:extLst>
+          </p:cNvPr>
+          <p:cNvSpPr txBox="1"/>
+          <p:nvPr/>
+        </p:nvSpPr>
+        <p:spPr>
+          <a:xfrm>
+            <a:off x="8152742" y="3357648"/>
+            <a:ext cx="3818009" cy="1200329"/>
+          </a:xfrm>
+          <a:prstGeom prst="rect">
+            <a:avLst/>
+          </a:prstGeom>
+          <a:noFill/>
+        </p:spPr>
+        <p:txBody>
+          <a:bodyPr wrap="square" rtlCol="0">
+            <a:spAutoFit/>
+          </a:bodyPr>
+          <a:lstStyle/>
+          <a:p>
+            <a:r>
+              <a:rPr lang="en-US" b="1" dirty="0"/>
+              <a:t>2. Correlate the predicted Y-values with the real Y-values for the held-out data </a:t>
+            </a:r>
+            <a:r>
+              <a:rPr lang="en-US" dirty="0"/>
+              <a:t>– this is the </a:t>
+            </a:r>
+            <a:r>
+              <a:rPr lang="en-US" b="1" dirty="0"/>
+              <a:t>prediction accuracy </a:t>
+            </a:r>
+            <a:r>
+              <a:rPr lang="en-US" dirty="0"/>
+              <a:t>for this </a:t>
+            </a:r>
+            <a:r>
+              <a:rPr lang="en-US" i="1" dirty="0"/>
+              <a:t>action</a:t>
+            </a:r>
+          </a:p>
+        </p:txBody>
+      </p:sp>
+      <p:cxnSp>
+        <p:nvCxnSpPr>
+          <p:cNvPr id="65" name="Straight Arrow Connector 64">
+            <a:extLst>
+              <a:ext uri="{FF2B5EF4-FFF2-40B4-BE49-F238E27FC236}">
+                <a16:creationId xmlns:a16="http://schemas.microsoft.com/office/drawing/2014/main" id="{470A03F9-C9F1-4932-938F-2AE0BE1130D5}"/>
+              </a:ext>
+            </a:extLst>
+          </p:cNvPr>
+          <p:cNvCxnSpPr/>
+          <p:nvPr/>
+        </p:nvCxnSpPr>
+        <p:spPr>
+          <a:xfrm>
+            <a:off x="7144284" y="3947450"/>
+            <a:ext cx="537569" cy="0"/>
+          </a:xfrm>
+          <a:prstGeom prst="straightConnector1">
+            <a:avLst/>
+          </a:prstGeom>
+          <a:ln>
+            <a:headEnd type="triangle"/>
+            <a:tailEnd type="triangle"/>
+          </a:ln>
+        </p:spPr>
+        <p:style>
+          <a:lnRef idx="1">
+            <a:schemeClr val="dk1"/>
+          </a:lnRef>
+          <a:fillRef idx="0">
+            <a:schemeClr val="dk1"/>
+          </a:fillRef>
+          <a:effectRef idx="0">
+            <a:schemeClr val="dk1"/>
+          </a:effectRef>
+          <a:fontRef idx="minor">
+            <a:schemeClr val="tx1"/>
+          </a:fontRef>
+        </p:style>
+      </p:cxnSp>
+      <p:sp>
+        <p:nvSpPr>
+          <p:cNvPr id="66" name="TextBox 65">
+            <a:extLst>
+              <a:ext uri="{FF2B5EF4-FFF2-40B4-BE49-F238E27FC236}">
+                <a16:creationId xmlns:a16="http://schemas.microsoft.com/office/drawing/2014/main" id="{719E0B2B-FC59-4B97-9684-5021CA31ADB7}"/>
+              </a:ext>
+            </a:extLst>
+          </p:cNvPr>
+          <p:cNvSpPr txBox="1"/>
+          <p:nvPr/>
+        </p:nvSpPr>
+        <p:spPr>
+          <a:xfrm>
+            <a:off x="7144284" y="3575531"/>
+            <a:ext cx="593432" cy="369332"/>
+          </a:xfrm>
+          <a:prstGeom prst="rect">
+            <a:avLst/>
+          </a:prstGeom>
+          <a:noFill/>
+        </p:spPr>
+        <p:txBody>
+          <a:bodyPr wrap="none" rtlCol="0">
+            <a:spAutoFit/>
+          </a:bodyPr>
+          <a:lstStyle/>
+          <a:p>
+            <a:r>
+              <a:rPr lang="en-US" i="1" dirty="0"/>
+              <a:t>r</a:t>
+            </a:r>
+            <a:r>
+              <a:rPr lang="en-US" dirty="0"/>
+              <a:t> = ?</a:t>
+            </a:r>
+            <a:endParaRPr lang="en-US" i="1" dirty="0"/>
+          </a:p>
+        </p:txBody>
+      </p:sp>
+      <p:sp>
+        <p:nvSpPr>
+          <p:cNvPr id="68" name="TextBox 67">
+            <a:extLst>
+              <a:ext uri="{FF2B5EF4-FFF2-40B4-BE49-F238E27FC236}">
+                <a16:creationId xmlns:a16="http://schemas.microsoft.com/office/drawing/2014/main" id="{9F233A64-3D71-45CB-8906-E7FF25B94E51}"/>
+              </a:ext>
+            </a:extLst>
+          </p:cNvPr>
+          <p:cNvSpPr txBox="1"/>
+          <p:nvPr/>
+        </p:nvSpPr>
+        <p:spPr>
+          <a:xfrm>
+            <a:off x="7717573" y="4140247"/>
+            <a:ext cx="296876" cy="369332"/>
+          </a:xfrm>
+          <a:prstGeom prst="rect">
+            <a:avLst/>
+          </a:prstGeom>
+          <a:noFill/>
+        </p:spPr>
+        <p:txBody>
+          <a:bodyPr wrap="none" rtlCol="0">
+            <a:spAutoFit/>
+          </a:bodyPr>
+          <a:lstStyle/>
+          <a:p>
+            <a:pPr algn="ctr"/>
+            <a:r>
+              <a:rPr lang="en-US" dirty="0"/>
+              <a:t>Y</a:t>
+            </a:r>
+          </a:p>
+        </p:txBody>
+      </p:sp>
+      <p:sp>
+        <p:nvSpPr>
+          <p:cNvPr id="70" name="TextBox 69">
+            <a:extLst>
+              <a:ext uri="{FF2B5EF4-FFF2-40B4-BE49-F238E27FC236}">
+                <a16:creationId xmlns:a16="http://schemas.microsoft.com/office/drawing/2014/main" id="{F30DAC0F-A69A-4BF2-B117-4BE69071410F}"/>
+              </a:ext>
+            </a:extLst>
+          </p:cNvPr>
+          <p:cNvSpPr txBox="1"/>
+          <p:nvPr/>
+        </p:nvSpPr>
+        <p:spPr>
+          <a:xfrm>
+            <a:off x="6842279" y="4175673"/>
+            <a:ext cx="296876" cy="369332"/>
+          </a:xfrm>
+          <a:prstGeom prst="rect">
+            <a:avLst/>
+          </a:prstGeom>
+          <a:noFill/>
+        </p:spPr>
+        <p:txBody>
+          <a:bodyPr wrap="none" rtlCol="0">
+            <a:spAutoFit/>
+          </a:bodyPr>
+          <a:lstStyle/>
+          <a:p>
+            <a:pPr algn="ctr"/>
+            <a:r>
+              <a:rPr lang="en-US" dirty="0"/>
+              <a:t>Ŷ</a:t>
+            </a:r>
+          </a:p>
+        </p:txBody>
+      </p:sp>
+      <p:sp>
+        <p:nvSpPr>
+          <p:cNvPr id="2" name="TextBox 1">
+            <a:extLst>
+              <a:ext uri="{FF2B5EF4-FFF2-40B4-BE49-F238E27FC236}">
+                <a16:creationId xmlns:a16="http://schemas.microsoft.com/office/drawing/2014/main" id="{620CE255-FBAC-4C12-A582-2EF4A35D40BA}"/>
+              </a:ext>
+            </a:extLst>
+          </p:cNvPr>
+          <p:cNvSpPr txBox="1"/>
+          <p:nvPr/>
+        </p:nvSpPr>
+        <p:spPr>
+          <a:xfrm>
+            <a:off x="3005955" y="34808"/>
+            <a:ext cx="6217728" cy="707886"/>
+          </a:xfrm>
+          <a:prstGeom prst="rect">
+            <a:avLst/>
+          </a:prstGeom>
+          <a:noFill/>
+        </p:spPr>
+        <p:txBody>
+          <a:bodyPr wrap="none" rtlCol="0">
+            <a:spAutoFit/>
+          </a:bodyPr>
+          <a:lstStyle/>
+          <a:p>
+            <a:pPr algn="ctr"/>
+            <a:r>
+              <a:rPr lang="en-US" sz="2000" b="1" dirty="0"/>
+              <a:t>Cross-validation to get a model’s prediction performance</a:t>
+            </a:r>
+          </a:p>
+          <a:p>
+            <a:pPr algn="ctr"/>
+            <a:r>
+              <a:rPr lang="en-US" sz="2000" b="1" dirty="0"/>
+              <a:t>Method 2: Group-Level Data</a:t>
+            </a:r>
+          </a:p>
+        </p:txBody>
+      </p:sp>
+      <p:sp>
+        <p:nvSpPr>
+          <p:cNvPr id="3" name="Rectangle 2">
+            <a:extLst>
+              <a:ext uri="{FF2B5EF4-FFF2-40B4-BE49-F238E27FC236}">
+                <a16:creationId xmlns:a16="http://schemas.microsoft.com/office/drawing/2014/main" id="{D646480B-975F-4C12-90B6-730A0C003C38}"/>
+              </a:ext>
+            </a:extLst>
+          </p:cNvPr>
+          <p:cNvSpPr/>
+          <p:nvPr/>
+        </p:nvSpPr>
+        <p:spPr>
+          <a:xfrm>
+            <a:off x="6940395" y="3683047"/>
+            <a:ext cx="100644" cy="457200"/>
+          </a:xfrm>
+          <a:prstGeom prst="rect">
+            <a:avLst/>
+          </a:prstGeom>
+          <a:solidFill>
+            <a:srgbClr val="FF0000"/>
+          </a:solidFill>
+          <a:ln w="38100">
+            <a:solidFill>
+              <a:schemeClr val="bg1">
+                <a:lumMod val="65000"/>
+              </a:schemeClr>
+            </a:solidFill>
+          </a:ln>
+        </p:spPr>
+        <p:style>
+          <a:lnRef idx="2">
+            <a:schemeClr val="accent1">
+              <a:shade val="50000"/>
+            </a:schemeClr>
+          </a:lnRef>
+          <a:fillRef idx="1">
+            <a:schemeClr val="accent1"/>
+          </a:fillRef>
+          <a:effectRef idx="0">
+            <a:schemeClr val="accent1"/>
+          </a:effectRef>
+          <a:fontRef idx="minor">
+            <a:schemeClr val="lt1"/>
+          </a:fontRef>
+        </p:style>
+        <p:txBody>
+          <a:bodyPr rtlCol="0" anchor="ctr"/>
+          <a:lstStyle/>
+          <a:p>
+            <a:pPr algn="ctr"/>
+            <a:endParaRPr lang="en-US"/>
+          </a:p>
+        </p:txBody>
+      </p:sp>
+      <p:sp>
+        <p:nvSpPr>
+          <p:cNvPr id="4" name="Rectangle 3">
+            <a:extLst>
+              <a:ext uri="{FF2B5EF4-FFF2-40B4-BE49-F238E27FC236}">
+                <a16:creationId xmlns:a16="http://schemas.microsoft.com/office/drawing/2014/main" id="{C0C06931-EF26-41E9-A96A-769FF15476C5}"/>
+              </a:ext>
+            </a:extLst>
+          </p:cNvPr>
+          <p:cNvSpPr/>
+          <p:nvPr/>
+        </p:nvSpPr>
+        <p:spPr>
+          <a:xfrm>
+            <a:off x="7799084" y="3683047"/>
+            <a:ext cx="100644" cy="457200"/>
+          </a:xfrm>
+          <a:prstGeom prst="rect">
+            <a:avLst/>
+          </a:prstGeom>
+          <a:solidFill>
+            <a:srgbClr val="FF0000"/>
+          </a:solidFill>
+          <a:ln w="38100">
+            <a:solidFill>
+              <a:schemeClr val="tx1"/>
+            </a:solidFill>
+          </a:ln>
+        </p:spPr>
+        <p:style>
+          <a:lnRef idx="2">
+            <a:schemeClr val="accent1">
+              <a:shade val="50000"/>
+            </a:schemeClr>
+          </a:lnRef>
+          <a:fillRef idx="1">
+            <a:schemeClr val="accent1"/>
+          </a:fillRef>
+          <a:effectRef idx="0">
+            <a:schemeClr val="accent1"/>
+          </a:effectRef>
+          <a:fontRef idx="minor">
+            <a:schemeClr val="lt1"/>
+          </a:fontRef>
+        </p:style>
+        <p:txBody>
+          <a:bodyPr rtlCol="0" anchor="ctr"/>
+          <a:lstStyle/>
+          <a:p>
+            <a:pPr algn="ctr"/>
+            <a:endParaRPr lang="en-US"/>
+          </a:p>
+        </p:txBody>
+      </p:sp>
+    </p:spTree>
+    <p:extLst>
+      <p:ext uri="{BB962C8B-B14F-4D97-AF65-F5344CB8AC3E}">
+        <p14:creationId xmlns:p14="http://schemas.microsoft.com/office/powerpoint/2010/main" val="103715210"/>
+      </p:ext>
+    </p:extLst>
+  </p:cSld>
+  <p:clrMapOvr>
+    <a:masterClrMapping/>
+  </p:clrMapOvr>
+</p:sld>
+</file>
+
+<file path=ppt/slides/slide5.xml><?xml version="1.0" encoding="utf-8"?>
+<p:sld xmlns:a="http://schemas.openxmlformats.org/drawingml/2006/main" xmlns:r="http://schemas.openxmlformats.org/officeDocument/2006/relationships" xmlns:p="http://schemas.openxmlformats.org/presentationml/2006/main">
+  <p:cSld>
+    <p:spTree>
+      <p:nvGrpSpPr>
+        <p:cNvPr id="1" name=""/>
+        <p:cNvGrpSpPr/>
+        <p:nvPr/>
+      </p:nvGrpSpPr>
+      <p:grpSpPr>
+        <a:xfrm>
+          <a:off x="0" y="0"/>
+          <a:ext cx="0" cy="0"/>
+          <a:chOff x="0" y="0"/>
+          <a:chExt cx="0" cy="0"/>
+        </a:xfrm>
+      </p:grpSpPr>
+      <p:sp>
+        <p:nvSpPr>
+          <p:cNvPr id="5" name="TextBox 4">
+            <a:extLst>
+              <a:ext uri="{FF2B5EF4-FFF2-40B4-BE49-F238E27FC236}">
+                <a16:creationId xmlns:a16="http://schemas.microsoft.com/office/drawing/2014/main" id="{DA18BA5B-B14F-40BA-8CB2-2354C3FD70D1}"/>
+              </a:ext>
+            </a:extLst>
+          </p:cNvPr>
+          <p:cNvSpPr txBox="1"/>
+          <p:nvPr/>
+        </p:nvSpPr>
+        <p:spPr>
+          <a:xfrm>
+            <a:off x="3005955" y="34808"/>
+            <a:ext cx="6217728" cy="707886"/>
+          </a:xfrm>
+          <a:prstGeom prst="rect">
+            <a:avLst/>
+          </a:prstGeom>
+          <a:noFill/>
+        </p:spPr>
+        <p:txBody>
+          <a:bodyPr wrap="none" rtlCol="0">
+            <a:spAutoFit/>
+          </a:bodyPr>
+          <a:lstStyle/>
+          <a:p>
+            <a:pPr algn="ctr"/>
+            <a:r>
+              <a:rPr lang="en-US" sz="2000" b="1" dirty="0"/>
+              <a:t>Cross-validation to get a model’s prediction performance</a:t>
+            </a:r>
+          </a:p>
+          <a:p>
+            <a:pPr algn="ctr"/>
+            <a:r>
+              <a:rPr lang="en-US" sz="2000" b="1" dirty="0"/>
+              <a:t>Method 2: Group-Level Data, continued</a:t>
+            </a:r>
+          </a:p>
+        </p:txBody>
+      </p:sp>
+      <p:sp>
+        <p:nvSpPr>
+          <p:cNvPr id="6" name="TextBox 5">
+            <a:extLst>
+              <a:ext uri="{FF2B5EF4-FFF2-40B4-BE49-F238E27FC236}">
+                <a16:creationId xmlns:a16="http://schemas.microsoft.com/office/drawing/2014/main" id="{74C320DA-9805-4D86-B59B-46B04CF3E18D}"/>
+              </a:ext>
+            </a:extLst>
+          </p:cNvPr>
+          <p:cNvSpPr txBox="1"/>
+          <p:nvPr/>
+        </p:nvSpPr>
+        <p:spPr>
+          <a:xfrm>
+            <a:off x="607340" y="1342238"/>
+            <a:ext cx="11162414" cy="2862322"/>
+          </a:xfrm>
+          <a:prstGeom prst="rect">
+            <a:avLst/>
+          </a:prstGeom>
+          <a:noFill/>
+        </p:spPr>
+        <p:txBody>
+          <a:bodyPr wrap="square" rtlCol="0">
+            <a:spAutoFit/>
+          </a:bodyPr>
+          <a:lstStyle/>
+          <a:p>
+            <a:r>
+              <a:rPr lang="en-US" b="1" dirty="0"/>
+              <a:t>Outcome: </a:t>
+            </a:r>
+            <a:r>
+              <a:rPr lang="en-US" dirty="0"/>
+              <a:t>a vector of 60 correlation values, which tells you how well the current set of features predicted the data for each action.</a:t>
+            </a:r>
+          </a:p>
+          <a:p>
+            <a:endParaRPr lang="en-US" b="1" dirty="0"/>
+          </a:p>
+          <a:p>
+            <a:r>
+              <a:rPr lang="en-US" b="1" dirty="0"/>
+              <a:t>Next step: statistical comparisons:</a:t>
+            </a:r>
+            <a:endParaRPr lang="en-US" dirty="0"/>
+          </a:p>
+          <a:p>
+            <a:r>
+              <a:rPr lang="en-US" dirty="0"/>
+              <a:t>…do these features predict the data better than chance? </a:t>
+            </a:r>
+            <a:r>
+              <a:rPr lang="en-US" dirty="0">
+                <a:sym typeface="Wingdings" panose="05000000000000000000" pitchFamily="2" charset="2"/>
+              </a:rPr>
+              <a:t> 1-sided Wilcoxon signed-rank test (non-parametric </a:t>
+            </a:r>
+            <a:r>
+              <a:rPr lang="en-US" i="1" dirty="0">
+                <a:sym typeface="Wingdings" panose="05000000000000000000" pitchFamily="2" charset="2"/>
+              </a:rPr>
+              <a:t>t</a:t>
+            </a:r>
+            <a:r>
+              <a:rPr lang="en-US" dirty="0">
+                <a:sym typeface="Wingdings" panose="05000000000000000000" pitchFamily="2" charset="2"/>
+              </a:rPr>
+              <a:t>-test)</a:t>
+            </a:r>
+            <a:endParaRPr lang="en-US" dirty="0"/>
+          </a:p>
+          <a:p>
+            <a:r>
+              <a:rPr lang="en-US" dirty="0"/>
+              <a:t>…do these features predict the data better than some alternative features? </a:t>
+            </a:r>
+            <a:r>
+              <a:rPr lang="en-US" dirty="0">
+                <a:sym typeface="Wingdings" panose="05000000000000000000" pitchFamily="2" charset="2"/>
+              </a:rPr>
+              <a:t> 2-sided Wilcoxon signed-rank test (non-parametric paired-samples t-test)</a:t>
+            </a:r>
+          </a:p>
+          <a:p>
+            <a:endParaRPr lang="en-US" dirty="0">
+              <a:sym typeface="Wingdings" panose="05000000000000000000" pitchFamily="2" charset="2"/>
+            </a:endParaRPr>
+          </a:p>
+          <a:p>
+            <a:r>
+              <a:rPr lang="en-US" b="1" dirty="0">
+                <a:sym typeface="Wingdings" panose="05000000000000000000" pitchFamily="2" charset="2"/>
+              </a:rPr>
+              <a:t>The outcome already has some variance (60 different correlation values), so you don’t need to do anything else to add it in.</a:t>
+            </a:r>
+            <a:endParaRPr lang="en-US" dirty="0">
+              <a:sym typeface="Wingdings" panose="05000000000000000000" pitchFamily="2" charset="2"/>
+            </a:endParaRPr>
+          </a:p>
+        </p:txBody>
+      </p:sp>
+    </p:spTree>
+    <p:extLst>
+      <p:ext uri="{BB962C8B-B14F-4D97-AF65-F5344CB8AC3E}">
+        <p14:creationId xmlns:p14="http://schemas.microsoft.com/office/powerpoint/2010/main" val="381951578"/>
       </p:ext>
     </p:extLst>
   </p:cSld>

</xml_diff>